<commit_message>
MAJ pour TP session juin
</commit_message>
<xml_diff>
--- a/docs/source/TP1/Session1_slides.pptx
+++ b/docs/source/TP1/Session1_slides.pptx
@@ -853,7 +853,7 @@
             <a:fld id="{96DFF08F-DC6B-4601-B491-B0F83F6DD2DA}" type="datetimeFigureOut">
               <a:rPr lang="en-US" smtClean="0"/>
               <a:pPr/>
-              <a:t>3/3/2017</a:t>
+              <a:t>30/05/17</a:t>
             </a:fld>
             <a:endParaRPr lang="en-US" dirty="0"/>
           </a:p>
@@ -896,7 +896,7 @@
             <a:fld id="{4FAB73BC-B049-4115-A692-8D63A059BFB8}" type="slidenum">
               <a:rPr lang="en-US" smtClean="0"/>
               <a:pPr/>
-              <a:t>‹N°›</a:t>
+              <a:t>‹#›</a:t>
             </a:fld>
             <a:endParaRPr lang="en-US" dirty="0"/>
           </a:p>
@@ -1106,7 +1106,7 @@
             <a:fld id="{96DFF08F-DC6B-4601-B491-B0F83F6DD2DA}" type="datetimeFigureOut">
               <a:rPr lang="en-US" smtClean="0"/>
               <a:pPr/>
-              <a:t>3/3/2017</a:t>
+              <a:t>30/05/17</a:t>
             </a:fld>
             <a:endParaRPr lang="en-US" dirty="0"/>
           </a:p>
@@ -1149,7 +1149,7 @@
             <a:fld id="{4FAB73BC-B049-4115-A692-8D63A059BFB8}" type="slidenum">
               <a:rPr lang="en-US" smtClean="0"/>
               <a:pPr/>
-              <a:t>‹N°›</a:t>
+              <a:t>‹#›</a:t>
             </a:fld>
             <a:endParaRPr lang="en-US" dirty="0"/>
           </a:p>
@@ -1422,7 +1422,7 @@
             <a:fld id="{96DFF08F-DC6B-4601-B491-B0F83F6DD2DA}" type="datetimeFigureOut">
               <a:rPr lang="en-US" smtClean="0"/>
               <a:pPr/>
-              <a:t>3/3/2017</a:t>
+              <a:t>30/05/17</a:t>
             </a:fld>
             <a:endParaRPr lang="en-US" dirty="0"/>
           </a:p>
@@ -1465,7 +1465,7 @@
             <a:fld id="{4FAB73BC-B049-4115-A692-8D63A059BFB8}" type="slidenum">
               <a:rPr lang="en-US" smtClean="0"/>
               <a:pPr/>
-              <a:t>‹N°›</a:t>
+              <a:t>‹#›</a:t>
             </a:fld>
             <a:endParaRPr lang="en-US" dirty="0"/>
           </a:p>
@@ -1765,7 +1765,7 @@
             <a:fld id="{96DFF08F-DC6B-4601-B491-B0F83F6DD2DA}" type="datetimeFigureOut">
               <a:rPr lang="en-US" smtClean="0"/>
               <a:pPr/>
-              <a:t>3/3/2017</a:t>
+              <a:t>30/05/17</a:t>
             </a:fld>
             <a:endParaRPr lang="en-US" dirty="0"/>
           </a:p>
@@ -1808,7 +1808,7 @@
             <a:fld id="{4FAB73BC-B049-4115-A692-8D63A059BFB8}" type="slidenum">
               <a:rPr lang="en-US" smtClean="0"/>
               <a:pPr/>
-              <a:t>‹N°›</a:t>
+              <a:t>‹#›</a:t>
             </a:fld>
             <a:endParaRPr lang="en-US" dirty="0"/>
           </a:p>
@@ -2081,7 +2081,7 @@
             <a:fld id="{96DFF08F-DC6B-4601-B491-B0F83F6DD2DA}" type="datetimeFigureOut">
               <a:rPr lang="en-US" smtClean="0"/>
               <a:pPr/>
-              <a:t>3/3/2017</a:t>
+              <a:t>30/05/17</a:t>
             </a:fld>
             <a:endParaRPr lang="en-US" dirty="0"/>
           </a:p>
@@ -2124,7 +2124,7 @@
             <a:fld id="{4FAB73BC-B049-4115-A692-8D63A059BFB8}" type="slidenum">
               <a:rPr lang="en-US" smtClean="0"/>
               <a:pPr/>
-              <a:t>‹N°›</a:t>
+              <a:t>‹#›</a:t>
             </a:fld>
             <a:endParaRPr lang="en-US" dirty="0"/>
           </a:p>
@@ -2476,7 +2476,7 @@
             <a:fld id="{96DFF08F-DC6B-4601-B491-B0F83F6DD2DA}" type="datetimeFigureOut">
               <a:rPr lang="en-US" smtClean="0"/>
               <a:pPr/>
-              <a:t>3/3/2017</a:t>
+              <a:t>30/05/17</a:t>
             </a:fld>
             <a:endParaRPr lang="en-US" dirty="0"/>
           </a:p>
@@ -2519,7 +2519,7 @@
             <a:fld id="{4FAB73BC-B049-4115-A692-8D63A059BFB8}" type="slidenum">
               <a:rPr lang="en-US" smtClean="0"/>
               <a:pPr/>
-              <a:t>‹N°›</a:t>
+              <a:t>‹#›</a:t>
             </a:fld>
             <a:endParaRPr lang="en-US" dirty="0"/>
           </a:p>
@@ -2647,7 +2647,7 @@
           <a:p>
             <a:fld id="{96DFF08F-DC6B-4601-B491-B0F83F6DD2DA}" type="datetimeFigureOut">
               <a:rPr lang="en-US" smtClean="0"/>
-              <a:t>3/3/2017</a:t>
+              <a:t>30/05/17</a:t>
             </a:fld>
             <a:endParaRPr lang="en-US" dirty="0"/>
           </a:p>
@@ -2689,7 +2689,7 @@
           <a:p>
             <a:fld id="{4FAB73BC-B049-4115-A692-8D63A059BFB8}" type="slidenum">
               <a:rPr lang="en-US" smtClean="0"/>
-              <a:t>‹N°›</a:t>
+              <a:t>‹#›</a:t>
             </a:fld>
             <a:endParaRPr lang="en-US" dirty="0"/>
           </a:p>
@@ -2827,7 +2827,7 @@
           <a:p>
             <a:fld id="{96DFF08F-DC6B-4601-B491-B0F83F6DD2DA}" type="datetimeFigureOut">
               <a:rPr lang="en-US" smtClean="0"/>
-              <a:t>3/3/2017</a:t>
+              <a:t>30/05/17</a:t>
             </a:fld>
             <a:endParaRPr lang="en-US" dirty="0"/>
           </a:p>
@@ -2869,7 +2869,7 @@
           <a:p>
             <a:fld id="{4FAB73BC-B049-4115-A692-8D63A059BFB8}" type="slidenum">
               <a:rPr lang="en-US" smtClean="0"/>
-              <a:t>‹N°›</a:t>
+              <a:t>‹#›</a:t>
             </a:fld>
             <a:endParaRPr lang="en-US" dirty="0"/>
           </a:p>
@@ -3003,7 +3003,7 @@
           <a:p>
             <a:fld id="{96DFF08F-DC6B-4601-B491-B0F83F6DD2DA}" type="datetimeFigureOut">
               <a:rPr lang="en-US" smtClean="0"/>
-              <a:t>3/3/2017</a:t>
+              <a:t>30/05/17</a:t>
             </a:fld>
             <a:endParaRPr lang="en-US" dirty="0"/>
           </a:p>
@@ -3045,7 +3045,7 @@
           <a:p>
             <a:fld id="{4FAB73BC-B049-4115-A692-8D63A059BFB8}" type="slidenum">
               <a:rPr lang="en-US" smtClean="0"/>
-              <a:t>‹N°›</a:t>
+              <a:t>‹#›</a:t>
             </a:fld>
             <a:endParaRPr lang="en-US" dirty="0"/>
           </a:p>
@@ -3250,7 +3250,7 @@
           <a:p>
             <a:fld id="{96DFF08F-DC6B-4601-B491-B0F83F6DD2DA}" type="datetimeFigureOut">
               <a:rPr lang="en-US" smtClean="0"/>
-              <a:t>3/3/2017</a:t>
+              <a:t>30/05/17</a:t>
             </a:fld>
             <a:endParaRPr lang="en-US" dirty="0"/>
           </a:p>
@@ -3292,7 +3292,7 @@
           <a:p>
             <a:fld id="{4FAB73BC-B049-4115-A692-8D63A059BFB8}" type="slidenum">
               <a:rPr lang="en-US" smtClean="0"/>
-              <a:t>‹N°›</a:t>
+              <a:t>‹#›</a:t>
             </a:fld>
             <a:endParaRPr lang="en-US" dirty="0"/>
           </a:p>
@@ -3482,7 +3482,7 @@
           <a:p>
             <a:fld id="{96DFF08F-DC6B-4601-B491-B0F83F6DD2DA}" type="datetimeFigureOut">
               <a:rPr lang="en-US" smtClean="0"/>
-              <a:t>3/3/2017</a:t>
+              <a:t>30/05/17</a:t>
             </a:fld>
             <a:endParaRPr lang="en-US" dirty="0"/>
           </a:p>
@@ -3524,7 +3524,7 @@
           <a:p>
             <a:fld id="{4FAB73BC-B049-4115-A692-8D63A059BFB8}" type="slidenum">
               <a:rPr lang="en-US" smtClean="0"/>
-              <a:t>‹N°›</a:t>
+              <a:t>‹#›</a:t>
             </a:fld>
             <a:endParaRPr lang="en-US" dirty="0"/>
           </a:p>
@@ -3856,7 +3856,7 @@
           <a:p>
             <a:fld id="{96DFF08F-DC6B-4601-B491-B0F83F6DD2DA}" type="datetimeFigureOut">
               <a:rPr lang="en-US" smtClean="0"/>
-              <a:t>3/3/2017</a:t>
+              <a:t>30/05/17</a:t>
             </a:fld>
             <a:endParaRPr lang="en-US" dirty="0"/>
           </a:p>
@@ -3898,7 +3898,7 @@
           <a:p>
             <a:fld id="{4FAB73BC-B049-4115-A692-8D63A059BFB8}" type="slidenum">
               <a:rPr lang="en-US" smtClean="0"/>
-              <a:t>‹N°›</a:t>
+              <a:t>‹#›</a:t>
             </a:fld>
             <a:endParaRPr lang="en-US" dirty="0"/>
           </a:p>
@@ -3979,7 +3979,7 @@
           <a:p>
             <a:fld id="{96DFF08F-DC6B-4601-B491-B0F83F6DD2DA}" type="datetimeFigureOut">
               <a:rPr lang="en-US" smtClean="0"/>
-              <a:t>3/3/2017</a:t>
+              <a:t>30/05/17</a:t>
             </a:fld>
             <a:endParaRPr lang="en-US" dirty="0"/>
           </a:p>
@@ -4021,7 +4021,7 @@
           <a:p>
             <a:fld id="{4FAB73BC-B049-4115-A692-8D63A059BFB8}" type="slidenum">
               <a:rPr lang="en-US" smtClean="0"/>
-              <a:t>‹N°›</a:t>
+              <a:t>‹#›</a:t>
             </a:fld>
             <a:endParaRPr lang="en-US" dirty="0"/>
           </a:p>
@@ -4074,7 +4074,7 @@
           <a:p>
             <a:fld id="{96DFF08F-DC6B-4601-B491-B0F83F6DD2DA}" type="datetimeFigureOut">
               <a:rPr lang="en-US" smtClean="0"/>
-              <a:t>3/3/2017</a:t>
+              <a:t>30/05/17</a:t>
             </a:fld>
             <a:endParaRPr lang="en-US" dirty="0"/>
           </a:p>
@@ -4116,7 +4116,7 @@
           <a:p>
             <a:fld id="{4FAB73BC-B049-4115-A692-8D63A059BFB8}" type="slidenum">
               <a:rPr lang="en-US" smtClean="0"/>
-              <a:t>‹N°›</a:t>
+              <a:t>‹#›</a:t>
             </a:fld>
             <a:endParaRPr lang="en-US" dirty="0"/>
           </a:p>
@@ -4329,7 +4329,7 @@
           <a:p>
             <a:fld id="{96DFF08F-DC6B-4601-B491-B0F83F6DD2DA}" type="datetimeFigureOut">
               <a:rPr lang="en-US" smtClean="0"/>
-              <a:t>3/3/2017</a:t>
+              <a:t>30/05/17</a:t>
             </a:fld>
             <a:endParaRPr lang="en-US" dirty="0"/>
           </a:p>
@@ -4371,7 +4371,7 @@
           <a:p>
             <a:fld id="{4FAB73BC-B049-4115-A692-8D63A059BFB8}" type="slidenum">
               <a:rPr lang="en-US" smtClean="0"/>
-              <a:t>‹N°›</a:t>
+              <a:t>‹#›</a:t>
             </a:fld>
             <a:endParaRPr lang="en-US" dirty="0"/>
           </a:p>
@@ -4592,7 +4592,7 @@
           <a:p>
             <a:fld id="{96DFF08F-DC6B-4601-B491-B0F83F6DD2DA}" type="datetimeFigureOut">
               <a:rPr lang="en-US" smtClean="0"/>
-              <a:t>3/3/2017</a:t>
+              <a:t>30/05/17</a:t>
             </a:fld>
             <a:endParaRPr lang="en-US" dirty="0"/>
           </a:p>
@@ -4634,7 +4634,7 @@
           <a:p>
             <a:fld id="{4FAB73BC-B049-4115-A692-8D63A059BFB8}" type="slidenum">
               <a:rPr lang="en-US" smtClean="0"/>
-              <a:t>‹N°›</a:t>
+              <a:t>‹#›</a:t>
             </a:fld>
             <a:endParaRPr lang="en-US" dirty="0"/>
           </a:p>
@@ -5336,7 +5336,7 @@
             <a:fld id="{96DFF08F-DC6B-4601-B491-B0F83F6DD2DA}" type="datetimeFigureOut">
               <a:rPr lang="en-US" smtClean="0"/>
               <a:pPr/>
-              <a:t>3/3/2017</a:t>
+              <a:t>30/05/17</a:t>
             </a:fld>
             <a:endParaRPr lang="en-US" dirty="0"/>
           </a:p>
@@ -5413,7 +5413,7 @@
             <a:fld id="{4FAB73BC-B049-4115-A692-8D63A059BFB8}" type="slidenum">
               <a:rPr lang="en-US" smtClean="0"/>
               <a:pPr/>
-              <a:t>‹N°›</a:t>
+              <a:t>‹#›</a:t>
             </a:fld>
             <a:endParaRPr lang="en-US" dirty="0"/>
           </a:p>
@@ -5921,7 +5921,15 @@
           <a:p>
             <a:r>
               <a:rPr lang="fr-FR" dirty="0" smtClean="0"/>
-              <a:t>6 mars 2017</a:t>
+              <a:t>31</a:t>
+            </a:r>
+            <a:r>
+              <a:rPr lang="fr-FR" dirty="0" smtClean="0"/>
+              <a:t> mai </a:t>
+            </a:r>
+            <a:r>
+              <a:rPr lang="fr-FR" dirty="0" smtClean="0"/>
+              <a:t>2017</a:t>
             </a:r>
           </a:p>
           <a:p>
@@ -5975,7 +5983,7 @@
           </a:prstGeom>
           <a:noFill/>
           <a:extLst>
-            <a:ext uri="{909E8E84-426E-40DD-AFC4-6F175D3DCCD1}">
+            <a:ext uri="{909E8E84-426E-40dd-AFC4-6F175D3DCCD1}">
               <a14:hiddenFill xmlns:a14="http://schemas.microsoft.com/office/drawing/2010/main">
                 <a:solidFill>
                   <a:srgbClr val="FFFFFF"/>
@@ -5998,7 +6006,7 @@
   <p:timing>
     <p:tnLst>
       <p:par>
-        <p:cTn id="1" dur="indefinite" restart="never" nodeType="tmRoot"/>
+        <p:cTn xmlns:p14="http://schemas.microsoft.com/office/powerpoint/2010/main" id="1" dur="indefinite" restart="never" nodeType="tmRoot"/>
       </p:par>
     </p:tnLst>
   </p:timing>
@@ -6166,7 +6174,7 @@
   <p:timing>
     <p:tnLst>
       <p:par>
-        <p:cTn id="1" dur="indefinite" restart="never" nodeType="tmRoot"/>
+        <p:cTn xmlns:p14="http://schemas.microsoft.com/office/powerpoint/2010/main" id="1" dur="indefinite" restart="never" nodeType="tmRoot"/>
       </p:par>
     </p:tnLst>
   </p:timing>
@@ -6447,7 +6455,7 @@
   <p:timing>
     <p:tnLst>
       <p:par>
-        <p:cTn id="1" dur="indefinite" restart="never" nodeType="tmRoot">
+        <p:cTn xmlns:p14="http://schemas.microsoft.com/office/powerpoint/2010/main" id="1" dur="indefinite" restart="never" nodeType="tmRoot">
           <p:childTnLst>
             <p:seq concurrent="1" nextAc="seek">
               <p:cTn id="2" dur="indefinite" nodeType="mainSeq">
@@ -6878,7 +6886,7 @@
   <p:timing>
     <p:tnLst>
       <p:par>
-        <p:cTn id="1" dur="indefinite" restart="never" nodeType="tmRoot"/>
+        <p:cTn xmlns:p14="http://schemas.microsoft.com/office/powerpoint/2010/main" id="1" dur="indefinite" restart="never" nodeType="tmRoot"/>
       </p:par>
     </p:tnLst>
   </p:timing>
@@ -7136,7 +7144,7 @@
   <p:timing>
     <p:tnLst>
       <p:par>
-        <p:cTn id="1" dur="indefinite" restart="never" nodeType="tmRoot">
+        <p:cTn xmlns:p14="http://schemas.microsoft.com/office/powerpoint/2010/main" id="1" dur="indefinite" restart="never" nodeType="tmRoot">
           <p:childTnLst>
             <p:seq concurrent="1" nextAc="seek">
               <p:cTn id="2" dur="indefinite" nodeType="mainSeq">
@@ -7546,7 +7554,7 @@
   <p:timing>
     <p:tnLst>
       <p:par>
-        <p:cTn id="1" dur="indefinite" restart="never" nodeType="tmRoot">
+        <p:cTn xmlns:p14="http://schemas.microsoft.com/office/powerpoint/2010/main" id="1" dur="indefinite" restart="never" nodeType="tmRoot">
           <p:childTnLst>
             <p:seq concurrent="1" nextAc="seek">
               <p:cTn id="2" dur="indefinite" nodeType="mainSeq">
@@ -7858,7 +7866,7 @@
   <p:timing>
     <p:tnLst>
       <p:par>
-        <p:cTn id="1" dur="indefinite" restart="never" nodeType="tmRoot">
+        <p:cTn xmlns:p14="http://schemas.microsoft.com/office/powerpoint/2010/main" id="1" dur="indefinite" restart="never" nodeType="tmRoot">
           <p:childTnLst>
             <p:seq concurrent="1" nextAc="seek">
               <p:cTn id="2" dur="indefinite" nodeType="mainSeq">
@@ -8055,7 +8063,7 @@
   <p:timing>
     <p:tnLst>
       <p:par>
-        <p:cTn id="1" dur="indefinite" restart="never" nodeType="tmRoot"/>
+        <p:cTn xmlns:p14="http://schemas.microsoft.com/office/powerpoint/2010/main" id="1" dur="indefinite" restart="never" nodeType="tmRoot"/>
       </p:par>
     </p:tnLst>
   </p:timing>
@@ -8117,7 +8125,7 @@
           </a:prstGeom>
           <a:noFill/>
           <a:extLst>
-            <a:ext uri="{909E8E84-426E-40DD-AFC4-6F175D3DCCD1}">
+            <a:ext uri="{909E8E84-426E-40dd-AFC4-6F175D3DCCD1}">
               <a14:hiddenFill xmlns:a14="http://schemas.microsoft.com/office/drawing/2010/main">
                 <a:solidFill>
                   <a:srgbClr val="FFFFFF"/>
@@ -8201,7 +8209,7 @@
   <p:timing>
     <p:tnLst>
       <p:par>
-        <p:cTn id="1" dur="indefinite" restart="never" nodeType="tmRoot"/>
+        <p:cTn xmlns:p14="http://schemas.microsoft.com/office/powerpoint/2010/main" id="1" dur="indefinite" restart="never" nodeType="tmRoot"/>
       </p:par>
     </p:tnLst>
   </p:timing>
@@ -8519,7 +8527,7 @@
   <p:timing>
     <p:tnLst>
       <p:par>
-        <p:cTn id="1" dur="indefinite" restart="never" nodeType="tmRoot"/>
+        <p:cTn xmlns:p14="http://schemas.microsoft.com/office/powerpoint/2010/main" id="1" dur="indefinite" restart="never" nodeType="tmRoot"/>
       </p:par>
     </p:tnLst>
   </p:timing>
@@ -8695,7 +8703,7 @@
   <p:timing>
     <p:tnLst>
       <p:par>
-        <p:cTn id="1" dur="indefinite" restart="never" nodeType="tmRoot">
+        <p:cTn xmlns:p14="http://schemas.microsoft.com/office/powerpoint/2010/main" id="1" dur="indefinite" restart="never" nodeType="tmRoot">
           <p:childTnLst>
             <p:seq concurrent="1" nextAc="seek">
               <p:cTn id="2" dur="indefinite" nodeType="mainSeq">
@@ -9050,7 +9058,7 @@
           </a:prstGeom>
           <a:noFill/>
           <a:extLst>
-            <a:ext uri="{909E8E84-426E-40DD-AFC4-6F175D3DCCD1}">
+            <a:ext uri="{909E8E84-426E-40dd-AFC4-6F175D3DCCD1}">
               <a14:hiddenFill xmlns:a14="http://schemas.microsoft.com/office/drawing/2010/main">
                 <a:solidFill>
                   <a:srgbClr val="FFFFFF"/>
@@ -9073,7 +9081,7 @@
   <p:timing>
     <p:tnLst>
       <p:par>
-        <p:cTn id="1" dur="indefinite" restart="never" nodeType="tmRoot"/>
+        <p:cTn xmlns:p14="http://schemas.microsoft.com/office/powerpoint/2010/main" id="1" dur="indefinite" restart="never" nodeType="tmRoot"/>
       </p:par>
     </p:tnLst>
   </p:timing>
@@ -9247,7 +9255,7 @@
           </a:prstGeom>
           <a:noFill/>
           <a:extLst>
-            <a:ext uri="{909E8E84-426E-40DD-AFC4-6F175D3DCCD1}">
+            <a:ext uri="{909E8E84-426E-40dd-AFC4-6F175D3DCCD1}">
               <a14:hiddenFill xmlns:a14="http://schemas.microsoft.com/office/drawing/2010/main">
                 <a:solidFill>
                   <a:srgbClr val="FFFFFF"/>
@@ -9288,7 +9296,7 @@
           </a:prstGeom>
           <a:noFill/>
           <a:extLst>
-            <a:ext uri="{909E8E84-426E-40DD-AFC4-6F175D3DCCD1}">
+            <a:ext uri="{909E8E84-426E-40dd-AFC4-6F175D3DCCD1}">
               <a14:hiddenFill xmlns:a14="http://schemas.microsoft.com/office/drawing/2010/main">
                 <a:solidFill>
                   <a:srgbClr val="FFFFFF"/>
@@ -9311,7 +9319,7 @@
   <p:timing>
     <p:tnLst>
       <p:par>
-        <p:cTn id="1" dur="indefinite" restart="never" nodeType="tmRoot"/>
+        <p:cTn xmlns:p14="http://schemas.microsoft.com/office/powerpoint/2010/main" id="1" dur="indefinite" restart="never" nodeType="tmRoot"/>
       </p:par>
     </p:tnLst>
   </p:timing>
@@ -9834,7 +9842,7 @@
   <p:timing>
     <p:tnLst>
       <p:par>
-        <p:cTn id="1" dur="indefinite" restart="never" nodeType="tmRoot"/>
+        <p:cTn xmlns:p14="http://schemas.microsoft.com/office/powerpoint/2010/main" id="1" dur="indefinite" restart="never" nodeType="tmRoot"/>
       </p:par>
     </p:tnLst>
   </p:timing>
@@ -10212,7 +10220,7 @@
   <p:timing>
     <p:tnLst>
       <p:par>
-        <p:cTn id="1" dur="indefinite" restart="never" nodeType="tmRoot"/>
+        <p:cTn xmlns:p14="http://schemas.microsoft.com/office/powerpoint/2010/main" id="1" dur="indefinite" restart="never" nodeType="tmRoot"/>
       </p:par>
     </p:tnLst>
   </p:timing>
@@ -10343,7 +10351,7 @@
   <p:timing>
     <p:tnLst>
       <p:par>
-        <p:cTn id="1" dur="indefinite" restart="never" nodeType="tmRoot"/>
+        <p:cTn xmlns:p14="http://schemas.microsoft.com/office/powerpoint/2010/main" id="1" dur="indefinite" restart="never" nodeType="tmRoot"/>
       </p:par>
     </p:tnLst>
   </p:timing>
@@ -10969,7 +10977,7 @@
   <p:timing>
     <p:tnLst>
       <p:par>
-        <p:cTn id="1" dur="indefinite" restart="never" nodeType="tmRoot"/>
+        <p:cTn xmlns:p14="http://schemas.microsoft.com/office/powerpoint/2010/main" id="1" dur="indefinite" restart="never" nodeType="tmRoot"/>
       </p:par>
     </p:tnLst>
   </p:timing>
@@ -11063,7 +11071,7 @@
   <p:timing>
     <p:tnLst>
       <p:par>
-        <p:cTn id="1" dur="indefinite" restart="never" nodeType="tmRoot"/>
+        <p:cTn xmlns:p14="http://schemas.microsoft.com/office/powerpoint/2010/main" id="1" dur="indefinite" restart="never" nodeType="tmRoot"/>
       </p:par>
     </p:tnLst>
   </p:timing>
@@ -11153,7 +11161,7 @@
   <p:timing>
     <p:tnLst>
       <p:par>
-        <p:cTn id="1" dur="indefinite" restart="never" nodeType="tmRoot"/>
+        <p:cTn xmlns:p14="http://schemas.microsoft.com/office/powerpoint/2010/main" id="1" dur="indefinite" restart="never" nodeType="tmRoot"/>
       </p:par>
     </p:tnLst>
   </p:timing>
@@ -11296,7 +11304,7 @@
   <p:timing>
     <p:tnLst>
       <p:par>
-        <p:cTn id="1" dur="indefinite" restart="never" nodeType="tmRoot"/>
+        <p:cTn xmlns:p14="http://schemas.microsoft.com/office/powerpoint/2010/main" id="1" dur="indefinite" restart="never" nodeType="tmRoot"/>
       </p:par>
     </p:tnLst>
   </p:timing>
@@ -11385,7 +11393,7 @@
   <p:timing>
     <p:tnLst>
       <p:par>
-        <p:cTn id="1" dur="indefinite" restart="never" nodeType="tmRoot"/>
+        <p:cTn xmlns:p14="http://schemas.microsoft.com/office/powerpoint/2010/main" id="1" dur="indefinite" restart="never" nodeType="tmRoot"/>
       </p:par>
     </p:tnLst>
   </p:timing>
@@ -11565,7 +11573,7 @@
   <p:timing>
     <p:tnLst>
       <p:par>
-        <p:cTn id="1" dur="indefinite" restart="never" nodeType="tmRoot"/>
+        <p:cTn xmlns:p14="http://schemas.microsoft.com/office/powerpoint/2010/main" id="1" dur="indefinite" restart="never" nodeType="tmRoot"/>
       </p:par>
     </p:tnLst>
   </p:timing>
@@ -11657,7 +11665,7 @@
   <p:timing>
     <p:tnLst>
       <p:par>
-        <p:cTn id="1" dur="indefinite" restart="never" nodeType="tmRoot"/>
+        <p:cTn xmlns:p14="http://schemas.microsoft.com/office/powerpoint/2010/main" id="1" dur="indefinite" restart="never" nodeType="tmRoot"/>
       </p:par>
     </p:tnLst>
   </p:timing>
@@ -11785,7 +11793,7 @@
   <p:timing>
     <p:tnLst>
       <p:par>
-        <p:cTn id="1" dur="indefinite" restart="never" nodeType="tmRoot"/>
+        <p:cTn xmlns:p14="http://schemas.microsoft.com/office/powerpoint/2010/main" id="1" dur="indefinite" restart="never" nodeType="tmRoot"/>
       </p:par>
     </p:tnLst>
   </p:timing>
@@ -11835,7 +11843,7 @@
     </a:clrScheme>
     <a:fontScheme name="Facette">
       <a:majorFont>
-        <a:latin typeface="Trebuchet MS" panose="020B0603020202020204"/>
+        <a:latin typeface="Trebuchet MS"/>
         <a:ea typeface=""/>
         <a:cs typeface=""/>
         <a:font script="Jpan" typeface="メイリオ"/>
@@ -11870,7 +11878,7 @@
         <a:font script="Geor" typeface="Sylfaen"/>
       </a:majorFont>
       <a:minorFont>
-        <a:latin typeface="Trebuchet MS" panose="020B0603020202020204"/>
+        <a:latin typeface="Trebuchet MS"/>
         <a:ea typeface=""/>
         <a:cs typeface=""/>
         <a:font script="Jpan" typeface="メイリオ"/>
@@ -12043,7 +12051,7 @@
   <a:extraClrSchemeLst/>
   <a:extLst>
     <a:ext uri="{05A4C25C-085E-4340-85A3-A5531E510DB2}">
-      <thm15:themeFamily xmlns:thm15="http://schemas.microsoft.com/office/thememl/2012/main" name="Facet" id="{C0C680CD-088A-49FC-A102-D699147F32B2}" vid="{CFBC31BA-B70F-4F30-BCAA-4F3011E16C4D}"/>
+      <thm15:themeFamily xmlns:thm15="http://schemas.microsoft.com/office/thememl/2012/main" xmlns="" name="Facet" id="{C0C680CD-088A-49FC-A102-D699147F32B2}" vid="{CFBC31BA-B70F-4F30-BCAA-4F3011E16C4D}"/>
     </a:ext>
   </a:extLst>
 </a:theme>

</xml_diff>